<commit_message>
slight change of ppt
</commit_message>
<xml_diff>
--- a/Travis.pptx
+++ b/Travis.pptx
@@ -16830,8 +16830,8 @@
         </p:blipFill>
         <p:spPr>
           <a:xfrm>
-            <a:off x="1916915" y="494792"/>
-            <a:ext cx="9170970" cy="5397800"/>
+            <a:off x="2634615" y="906780"/>
+            <a:ext cx="7691755" cy="4698365"/>
           </a:xfrm>
           <a:prstGeom prst="rect">
             <a:avLst/>
@@ -16848,7 +16848,7 @@
         </p:nvSpPr>
         <p:spPr>
           <a:xfrm>
-            <a:off x="787399" y="6039939"/>
+            <a:off x="787399" y="5824674"/>
             <a:ext cx="11430001" cy="1662946"/>
           </a:xfrm>
           <a:prstGeom prst="rect">
@@ -16902,7 +16902,7 @@
         </p:nvSpPr>
         <p:spPr>
           <a:xfrm>
-            <a:off x="787400" y="7761592"/>
+            <a:off x="787400" y="7474572"/>
             <a:ext cx="11430000" cy="808769"/>
           </a:xfrm>
           <a:prstGeom prst="rect">
@@ -16916,6 +16916,92 @@
             <a:r>
               <a:t>With Travis</a:t>
             </a:r>
+          </a:p>
+        </p:txBody>
+      </p:sp>
+      <p:sp>
+        <p:nvSpPr>
+          <p:cNvPr id="3" name="文本框 2"/>
+          <p:cNvSpPr txBox="1"/>
+          <p:nvPr/>
+        </p:nvSpPr>
+        <p:spPr>
+          <a:xfrm>
+            <a:off x="8332470" y="8283575"/>
+            <a:ext cx="3884930" cy="655320"/>
+          </a:xfrm>
+          <a:prstGeom prst="rect">
+            <a:avLst/>
+          </a:prstGeom>
+          <a:noFill/>
+          <a:ln w="12700" cap="flat">
+            <a:noFill/>
+            <a:miter lim="400000"/>
+          </a:ln>
+        </p:spPr>
+        <p:style>
+          <a:lnRef idx="0">
+            <a:srgbClr val="FFFFFF"/>
+          </a:lnRef>
+          <a:fillRef idx="0">
+            <a:srgbClr val="FFFFFF"/>
+          </a:fillRef>
+          <a:effectRef idx="0">
+            <a:srgbClr val="FFFFFF"/>
+          </a:effectRef>
+          <a:fontRef idx="none"/>
+        </p:style>
+        <p:txBody>
+          <a:bodyPr rot="0" vertOverflow="overflow" horzOverflow="overflow" vert="horz" wrap="square" lIns="50800" tIns="50800" rIns="50800" bIns="50800" numCol="1" spcCol="38100" rtlCol="0" anchor="ctr" forceAA="0" upright="0">
+            <a:spAutoFit/>
+          </a:bodyPr>
+          <a:p>
+            <a:pPr marL="0" marR="0" indent="0" algn="ctr" defTabSz="584200" rtl="0" fontAlgn="auto" latinLnBrk="0" hangingPunct="0">
+              <a:lnSpc>
+                <a:spcPct val="100000"/>
+              </a:lnSpc>
+              <a:spcBef>
+                <a:spcPts val="0"/>
+              </a:spcBef>
+              <a:spcAft>
+                <a:spcPts val="0"/>
+              </a:spcAft>
+              <a:buClrTx/>
+              <a:buSzTx/>
+              <a:buFontTx/>
+              <a:buNone/>
+            </a:pPr>
+            <a:r>
+              <a:rPr kumimoji="0" lang="zh-CN" altLang="en-US" sz="3600" b="0" i="0" u="none" strike="noStrike" cap="none" spc="0" normalizeH="0" baseline="0">
+                <a:ln>
+                  <a:noFill/>
+                </a:ln>
+                <a:solidFill>
+                  <a:srgbClr val="5E5E5E"/>
+                </a:solidFill>
+                <a:effectLst/>
+                <a:uFillTx/>
+                <a:latin typeface="Hoefler Text"/>
+                <a:ea typeface="Hoefler Text"/>
+                <a:cs typeface="Hoefler Text"/>
+                <a:sym typeface="Hoefler Text"/>
+              </a:rPr>
+              <a:t>李翌珺、宋逸凡</a:t>
+            </a:r>
+            <a:endParaRPr kumimoji="0" lang="zh-CN" altLang="en-US" sz="3600" b="0" i="0" u="none" strike="noStrike" cap="none" spc="0" normalizeH="0" baseline="0">
+              <a:ln>
+                <a:noFill/>
+              </a:ln>
+              <a:solidFill>
+                <a:srgbClr val="5E5E5E"/>
+              </a:solidFill>
+              <a:effectLst/>
+              <a:uFillTx/>
+              <a:latin typeface="Hoefler Text"/>
+              <a:ea typeface="Hoefler Text"/>
+              <a:cs typeface="Hoefler Text"/>
+              <a:sym typeface="Hoefler Text"/>
+            </a:endParaRPr>
           </a:p>
         </p:txBody>
       </p:sp>
@@ -19743,8 +19829,8 @@
           <a:solidFill>
             <a:schemeClr val="accent5">
               <a:hueOff val="85969"/>
-              <a:satOff val="-7809"/>
-              <a:lumOff val="-38953"/>
+              <a:satOff val="-7808"/>
+              <a:lumOff val="-38952"/>
             </a:schemeClr>
           </a:solidFill>
           <a:prstDash val="solid"/>
@@ -20787,8 +20873,8 @@
           <a:solidFill>
             <a:schemeClr val="accent5">
               <a:hueOff val="85969"/>
-              <a:satOff val="-7808"/>
-              <a:lumOff val="-38952"/>
+              <a:satOff val="-7807"/>
+              <a:lumOff val="-38951"/>
             </a:schemeClr>
           </a:solidFill>
           <a:prstDash val="solid"/>
@@ -21831,8 +21917,8 @@
           <a:solidFill>
             <a:schemeClr val="accent5">
               <a:hueOff val="85969"/>
-              <a:satOff val="-7807"/>
-              <a:lumOff val="-38951"/>
+              <a:satOff val="-7806"/>
+              <a:lumOff val="-38950"/>
             </a:schemeClr>
           </a:solidFill>
           <a:prstDash val="solid"/>
@@ -22875,8 +22961,8 @@
           <a:solidFill>
             <a:schemeClr val="accent5">
               <a:hueOff val="85969"/>
-              <a:satOff val="-7807"/>
-              <a:lumOff val="-38951"/>
+              <a:satOff val="-7806"/>
+              <a:lumOff val="-38950"/>
             </a:schemeClr>
           </a:solidFill>
           <a:prstDash val="solid"/>
@@ -23919,8 +24005,8 @@
           <a:solidFill>
             <a:schemeClr val="accent5">
               <a:hueOff val="85969"/>
-              <a:satOff val="-7806"/>
-              <a:lumOff val="-38950"/>
+              <a:satOff val="-7805"/>
+              <a:lumOff val="-38949"/>
             </a:schemeClr>
           </a:solidFill>
           <a:prstDash val="solid"/>
@@ -24963,8 +25049,8 @@
           <a:solidFill>
             <a:schemeClr val="accent5">
               <a:hueOff val="85969"/>
-              <a:satOff val="-7805"/>
-              <a:lumOff val="-38949"/>
+              <a:satOff val="-7804"/>
+              <a:lumOff val="-38948"/>
             </a:schemeClr>
           </a:solidFill>
           <a:prstDash val="solid"/>
@@ -26007,8 +26093,8 @@
           <a:solidFill>
             <a:schemeClr val="accent5">
               <a:hueOff val="85969"/>
-              <a:satOff val="-7809"/>
-              <a:lumOff val="-38953"/>
+              <a:satOff val="-7808"/>
+              <a:lumOff val="-38952"/>
             </a:schemeClr>
           </a:solidFill>
           <a:prstDash val="solid"/>

</xml_diff>

<commit_message>
Add conclude to ppt
</commit_message>
<xml_diff>
--- a/Travis.pptx
+++ b/Travis.pptx
@@ -10,7 +10,7 @@
     <p:sldMasterId id="2147483713" r:id="rId7"/>
   </p:sldMasterIdLst>
   <p:notesMasterIdLst>
-    <p:notesMasterId r:id="rId27"/>
+    <p:notesMasterId r:id="rId28"/>
   </p:notesMasterIdLst>
   <p:sldIdLst>
     <p:sldId id="256" r:id="rId8"/>
@@ -31,7 +31,8 @@
     <p:sldId id="269" r:id="rId23"/>
     <p:sldId id="275" r:id="rId24"/>
     <p:sldId id="270" r:id="rId25"/>
-    <p:sldId id="281" r:id="rId26"/>
+    <p:sldId id="282" r:id="rId26"/>
+    <p:sldId id="281" r:id="rId27"/>
   </p:sldIdLst>
   <p:sldSz cx="13004800" cy="9753600"/>
   <p:notesSz cx="6858000" cy="9144000"/>
@@ -16972,18 +16973,7 @@
               <a:buNone/>
             </a:pPr>
             <a:r>
-              <a:rPr kumimoji="0" lang="zh-CN" altLang="en-US" sz="3600" b="0" i="0" u="none" strike="noStrike" cap="none" spc="0" normalizeH="0" baseline="0">
-                <a:ln>
-                  <a:noFill/>
-                </a:ln>
-                <a:solidFill>
-                  <a:srgbClr val="5E5E5E"/>
-                </a:solidFill>
-                <a:effectLst/>
-                <a:uFillTx/>
-                <a:latin typeface="Hoefler Text"/>
-                <a:ea typeface="Hoefler Text"/>
-                <a:cs typeface="Hoefler Text"/>
+              <a:rPr lang="zh-CN" altLang="en-US">
                 <a:sym typeface="Hoefler Text"/>
               </a:rPr>
               <a:t>李翌珺、宋逸凡</a:t>
@@ -17182,7 +17172,9 @@
           </a:prstGeom>
         </p:spPr>
         <p:txBody>
-          <a:bodyPr/>
+          <a:bodyPr>
+            <a:normAutofit fontScale="90000"/>
+          </a:bodyPr>
           <a:lstStyle/>
           <a:p>
             <a:r>
@@ -17193,6 +17185,13 @@
             <a:r>
               <a:t>with Travis</a:t>
             </a:r>
+            <a:r>
+              <a:rPr lang="en-US"/>
+              <a:t>/Github Pages</a:t>
+            </a:r>
+            <a:endParaRPr lang="en-US">
+              <a:ea typeface="宋体" panose="02010600030101010101" pitchFamily="2" charset="-122"/>
+            </a:endParaRPr>
           </a:p>
         </p:txBody>
       </p:sp>
@@ -17205,6 +17204,10 @@
           </p:nvPr>
         </p:nvSpPr>
         <p:spPr>
+          <a:xfrm>
+            <a:off x="787400" y="5667375"/>
+            <a:ext cx="11430000" cy="1447800"/>
+          </a:xfrm>
           <a:prstGeom prst="rect">
             <a:avLst/>
           </a:prstGeom>
@@ -18397,7 +18400,7 @@
         </p:nvSpPr>
         <p:spPr>
           <a:xfrm>
-            <a:off x="787400" y="3695065"/>
+            <a:off x="800100" y="889000"/>
             <a:ext cx="11430000" cy="1270000"/>
           </a:xfrm>
         </p:spPr>
@@ -18408,17 +18411,141 @@
           <a:p>
             <a:r>
               <a:rPr lang="en-US" altLang="zh-CN"/>
-              <a:t>Thanks</a:t>
-            </a:r>
-            <a:r>
-              <a:rPr lang="zh-CN" altLang="en-US">
-                <a:ea typeface="宋体" panose="02010600030101010101" pitchFamily="2" charset="-122"/>
-              </a:rPr>
-              <a:t>！</a:t>
-            </a:r>
-            <a:endParaRPr lang="zh-CN" altLang="en-US">
-              <a:ea typeface="宋体" panose="02010600030101010101" pitchFamily="2" charset="-122"/>
-            </a:endParaRPr>
+              <a:t>Conclude</a:t>
+            </a:r>
+            <a:endParaRPr lang="en-US" altLang="zh-CN"/>
+          </a:p>
+        </p:txBody>
+      </p:sp>
+      <p:sp>
+        <p:nvSpPr>
+          <p:cNvPr id="4" name="文本占位符 3"/>
+          <p:cNvSpPr/>
+          <p:nvPr>
+            <p:ph type="body" sz="quarter" idx="1"/>
+          </p:nvPr>
+        </p:nvSpPr>
+        <p:spPr>
+          <a:xfrm>
+            <a:off x="901065" y="2517775"/>
+            <a:ext cx="11430000" cy="5837555"/>
+          </a:xfrm>
+        </p:spPr>
+        <p:txBody>
+          <a:bodyPr>
+            <a:normAutofit lnSpcReduction="20000"/>
+          </a:bodyPr>
+          <a:p>
+            <a:r>
+              <a:rPr lang="en-US" altLang="zh-CN"/>
+              <a:t>T</a:t>
+            </a:r>
+            <a:r>
+              <a:rPr lang="zh-CN" altLang="en-US"/>
+              <a:t>ravis-ci is </a:t>
+            </a:r>
+            <a:r>
+              <a:rPr lang="en-US" altLang="zh-CN"/>
+              <a:t>a free</a:t>
+            </a:r>
+            <a:r>
+              <a:rPr lang="zh-CN" altLang="en-US"/>
+              <a:t> cloud service. Private repo </a:t>
+            </a:r>
+            <a:r>
+              <a:rPr lang="en-US" altLang="zh-CN"/>
+              <a:t>CI service</a:t>
+            </a:r>
+            <a:r>
+              <a:rPr lang="zh-CN" altLang="en-US"/>
+              <a:t> is charging. </a:t>
+            </a:r>
+            <a:r>
+              <a:rPr lang="en-US" altLang="zh-CN"/>
+              <a:t>Thus w</a:t>
+            </a:r>
+            <a:r>
+              <a:rPr lang="zh-CN" altLang="en-US"/>
+              <a:t>e can choose to build our own CI platform with Jenkins or drone.</a:t>
+            </a:r>
+            <a:endParaRPr lang="zh-CN" altLang="en-US"/>
+          </a:p>
+          <a:p>
+            <a:endParaRPr lang="zh-CN" altLang="en-US"/>
+          </a:p>
+          <a:p>
+            <a:r>
+              <a:rPr lang="zh-CN" altLang="en-US"/>
+              <a:t>Similarly, </a:t>
+            </a:r>
+            <a:r>
+              <a:rPr lang="en-US" altLang="zh-CN"/>
+              <a:t>our </a:t>
+            </a:r>
+            <a:r>
+              <a:rPr lang="zh-CN" altLang="en-US"/>
+              <a:t>CD</a:t>
+            </a:r>
+            <a:r>
+              <a:rPr lang="en-US" altLang="zh-CN"/>
+              <a:t> is</a:t>
+            </a:r>
+            <a:r>
+              <a:rPr lang="zh-CN" altLang="en-US"/>
+              <a:t> currently deployed on the heroku server </a:t>
+            </a:r>
+            <a:r>
+              <a:rPr lang="en-US" altLang="zh-CN"/>
+              <a:t>or github pages</a:t>
+            </a:r>
+            <a:r>
+              <a:rPr lang="zh-CN" altLang="en-US"/>
+              <a:t>. In actual production, </a:t>
+            </a:r>
+            <a:r>
+              <a:rPr lang="en-US" altLang="zh-CN"/>
+              <a:t>we should use </a:t>
+            </a:r>
+            <a:r>
+              <a:rPr lang="zh-CN" altLang="en-US"/>
+              <a:t>puppet or </a:t>
+            </a:r>
+            <a:r>
+              <a:rPr lang="en-US" altLang="zh-CN"/>
+              <a:t>some</a:t>
+            </a:r>
+            <a:r>
+              <a:rPr lang="zh-CN" altLang="en-US"/>
+              <a:t> other tools </a:t>
+            </a:r>
+            <a:r>
+              <a:rPr lang="en-US" altLang="zh-CN"/>
+              <a:t>to</a:t>
+            </a:r>
+            <a:r>
+              <a:rPr lang="zh-CN" altLang="en-US"/>
+              <a:t> deploy </a:t>
+            </a:r>
+            <a:r>
+              <a:rPr lang="en-US" altLang="zh-CN"/>
+              <a:t>the project</a:t>
+            </a:r>
+            <a:r>
+              <a:rPr lang="zh-CN" altLang="en-US"/>
+              <a:t> on </a:t>
+            </a:r>
+            <a:r>
+              <a:rPr lang="en-US" altLang="zh-CN"/>
+              <a:t>our own</a:t>
+            </a:r>
+            <a:r>
+              <a:rPr lang="zh-CN" altLang="en-US"/>
+              <a:t> server.</a:t>
+            </a:r>
+            <a:endParaRPr lang="zh-CN" altLang="en-US"/>
+          </a:p>
+          <a:p>
+            <a:endParaRPr lang="zh-CN" altLang="en-US"/>
           </a:p>
         </p:txBody>
       </p:sp>
@@ -18540,6 +18667,60 @@
             <a:r>
               <a:t> goes further and pushes changes to production automatically.</a:t>
             </a:r>
+          </a:p>
+        </p:txBody>
+      </p:sp>
+    </p:spTree>
+  </p:cSld>
+  <p:clrMapOvr>
+    <a:masterClrMapping/>
+  </p:clrMapOvr>
+  <p:transition spd="med"/>
+</p:sld>
+</file>
+
+<file path=ppt/slides/slide20.xml><?xml version="1.0" encoding="utf-8"?>
+<p:sld xmlns:a="http://schemas.openxmlformats.org/drawingml/2006/main" xmlns:r="http://schemas.openxmlformats.org/officeDocument/2006/relationships" xmlns:p="http://schemas.openxmlformats.org/presentationml/2006/main">
+  <p:cSld>
+    <p:spTree>
+      <p:nvGrpSpPr>
+        <p:cNvPr id="1" name=""/>
+        <p:cNvGrpSpPr/>
+        <p:nvPr/>
+      </p:nvGrpSpPr>
+      <p:grpSpPr/>
+      <p:sp>
+        <p:nvSpPr>
+          <p:cNvPr id="3" name="标题 2"/>
+          <p:cNvSpPr/>
+          <p:nvPr>
+            <p:ph type="title"/>
+          </p:nvPr>
+        </p:nvSpPr>
+        <p:spPr>
+          <a:xfrm>
+            <a:off x="787400" y="3695065"/>
+            <a:ext cx="11430000" cy="1270000"/>
+          </a:xfrm>
+        </p:spPr>
+        <p:txBody>
+          <a:bodyPr>
+            <a:normAutofit fontScale="90000"/>
+          </a:bodyPr>
+          <a:p>
+            <a:r>
+              <a:rPr lang="en-US" altLang="zh-CN"/>
+              <a:t>Thanks</a:t>
+            </a:r>
+            <a:r>
+              <a:rPr lang="zh-CN" altLang="en-US">
+                <a:ea typeface="宋体" panose="02010600030101010101" pitchFamily="2" charset="-122"/>
+              </a:rPr>
+              <a:t>！</a:t>
+            </a:r>
+            <a:endParaRPr lang="zh-CN" altLang="en-US">
+              <a:ea typeface="宋体" panose="02010600030101010101" pitchFamily="2" charset="-122"/>
+            </a:endParaRPr>
           </a:p>
         </p:txBody>
       </p:sp>
@@ -19829,8 +20010,8 @@
           <a:solidFill>
             <a:schemeClr val="accent5">
               <a:hueOff val="85969"/>
-              <a:satOff val="-7808"/>
-              <a:lumOff val="-38952"/>
+              <a:satOff val="-7807"/>
+              <a:lumOff val="-38951"/>
             </a:schemeClr>
           </a:solidFill>
           <a:prstDash val="solid"/>
@@ -20873,8 +21054,8 @@
           <a:solidFill>
             <a:schemeClr val="accent5">
               <a:hueOff val="85969"/>
-              <a:satOff val="-7807"/>
-              <a:lumOff val="-38951"/>
+              <a:satOff val="-7806"/>
+              <a:lumOff val="-38950"/>
             </a:schemeClr>
           </a:solidFill>
           <a:prstDash val="solid"/>
@@ -21917,8 +22098,8 @@
           <a:solidFill>
             <a:schemeClr val="accent5">
               <a:hueOff val="85969"/>
-              <a:satOff val="-7806"/>
-              <a:lumOff val="-38950"/>
+              <a:satOff val="-7805"/>
+              <a:lumOff val="-38949"/>
             </a:schemeClr>
           </a:solidFill>
           <a:prstDash val="solid"/>
@@ -22961,8 +23142,8 @@
           <a:solidFill>
             <a:schemeClr val="accent5">
               <a:hueOff val="85969"/>
-              <a:satOff val="-7806"/>
-              <a:lumOff val="-38950"/>
+              <a:satOff val="-7805"/>
+              <a:lumOff val="-38949"/>
             </a:schemeClr>
           </a:solidFill>
           <a:prstDash val="solid"/>
@@ -24005,8 +24186,8 @@
           <a:solidFill>
             <a:schemeClr val="accent5">
               <a:hueOff val="85969"/>
-              <a:satOff val="-7805"/>
-              <a:lumOff val="-38949"/>
+              <a:satOff val="-7804"/>
+              <a:lumOff val="-38948"/>
             </a:schemeClr>
           </a:solidFill>
           <a:prstDash val="solid"/>
@@ -25049,8 +25230,8 @@
           <a:solidFill>
             <a:schemeClr val="accent5">
               <a:hueOff val="85969"/>
-              <a:satOff val="-7804"/>
-              <a:lumOff val="-38948"/>
+              <a:satOff val="-7803"/>
+              <a:lumOff val="-38947"/>
             </a:schemeClr>
           </a:solidFill>
           <a:prstDash val="solid"/>
@@ -26093,8 +26274,8 @@
           <a:solidFill>
             <a:schemeClr val="accent5">
               <a:hueOff val="85969"/>
-              <a:satOff val="-7808"/>
-              <a:lumOff val="-38952"/>
+              <a:satOff val="-7807"/>
+              <a:lumOff val="-38951"/>
             </a:schemeClr>
           </a:solidFill>
           <a:prstDash val="solid"/>

</xml_diff>